<commit_message>
hyperlinked from presentation to heroku
</commit_message>
<xml_diff>
--- a/Stroke/Presentation/Stroke_Prediction_presentation.pptx
+++ b/Stroke/Presentation/Stroke_Prediction_presentation.pptx
@@ -15,8 +15,8 @@
     <p:sldId id="261" r:id="rId6"/>
     <p:sldId id="263" r:id="rId7"/>
     <p:sldId id="264" r:id="rId8"/>
-    <p:sldId id="265" r:id="rId9"/>
-    <p:sldId id="267" r:id="rId10"/>
+    <p:sldId id="267" r:id="rId9"/>
+    <p:sldId id="265" r:id="rId10"/>
   </p:sldIdLst>
   <p:sldSz cx="12192000" cy="6858000"/>
   <p:notesSz cx="6858000" cy="9144000"/>
@@ -205,7 +205,7 @@
           <a:p>
             <a:fld id="{8097F693-D507-43C6-8245-ADCE4295D6C6}" type="datetimeFigureOut">
               <a:rPr lang="en-US" smtClean="0"/>
-              <a:t>5/3/2021</a:t>
+              <a:t>5/4/2021</a:t>
             </a:fld>
             <a:endParaRPr lang="en-US"/>
           </a:p>
@@ -832,7 +832,7 @@
           <a:p>
             <a:fld id="{36E0AE52-3AEA-4A54-9303-4D1675DB3C41}" type="datetimeFigureOut">
               <a:rPr lang="en-US" smtClean="0"/>
-              <a:t>5/3/2021</a:t>
+              <a:t>5/4/2021</a:t>
             </a:fld>
             <a:endParaRPr lang="en-US"/>
           </a:p>
@@ -1054,7 +1054,7 @@
           <a:p>
             <a:fld id="{36E0AE52-3AEA-4A54-9303-4D1675DB3C41}" type="datetimeFigureOut">
               <a:rPr lang="en-US" smtClean="0"/>
-              <a:t>5/3/2021</a:t>
+              <a:t>5/4/2021</a:t>
             </a:fld>
             <a:endParaRPr lang="en-US"/>
           </a:p>
@@ -1286,7 +1286,7 @@
           <a:p>
             <a:fld id="{36E0AE52-3AEA-4A54-9303-4D1675DB3C41}" type="datetimeFigureOut">
               <a:rPr lang="en-US" smtClean="0"/>
-              <a:t>5/3/2021</a:t>
+              <a:t>5/4/2021</a:t>
             </a:fld>
             <a:endParaRPr lang="en-US"/>
           </a:p>
@@ -1566,7 +1566,7 @@
           <a:p>
             <a:fld id="{36E0AE52-3AEA-4A54-9303-4D1675DB3C41}" type="datetimeFigureOut">
               <a:rPr lang="en-US" smtClean="0"/>
-              <a:t>5/3/2021</a:t>
+              <a:t>5/4/2021</a:t>
             </a:fld>
             <a:endParaRPr lang="en-US"/>
           </a:p>
@@ -2047,7 +2047,7 @@
           <a:p>
             <a:fld id="{36E0AE52-3AEA-4A54-9303-4D1675DB3C41}" type="datetimeFigureOut">
               <a:rPr lang="en-US" smtClean="0"/>
-              <a:t>5/3/2021</a:t>
+              <a:t>5/4/2021</a:t>
             </a:fld>
             <a:endParaRPr lang="en-US"/>
           </a:p>
@@ -2483,7 +2483,7 @@
           <a:p>
             <a:fld id="{36E0AE52-3AEA-4A54-9303-4D1675DB3C41}" type="datetimeFigureOut">
               <a:rPr lang="en-US" smtClean="0"/>
-              <a:t>5/3/2021</a:t>
+              <a:t>5/4/2021</a:t>
             </a:fld>
             <a:endParaRPr lang="en-US"/>
           </a:p>
@@ -2648,7 +2648,7 @@
           <a:p>
             <a:fld id="{36E0AE52-3AEA-4A54-9303-4D1675DB3C41}" type="datetimeFigureOut">
               <a:rPr lang="en-US" smtClean="0"/>
-              <a:t>5/3/2021</a:t>
+              <a:t>5/4/2021</a:t>
             </a:fld>
             <a:endParaRPr lang="en-US"/>
           </a:p>
@@ -2785,7 +2785,7 @@
           <a:p>
             <a:fld id="{36E0AE52-3AEA-4A54-9303-4D1675DB3C41}" type="datetimeFigureOut">
               <a:rPr lang="en-US" smtClean="0"/>
-              <a:t>5/3/2021</a:t>
+              <a:t>5/4/2021</a:t>
             </a:fld>
             <a:endParaRPr lang="en-US"/>
           </a:p>
@@ -3120,7 +3120,7 @@
           <a:p>
             <a:fld id="{36E0AE52-3AEA-4A54-9303-4D1675DB3C41}" type="datetimeFigureOut">
               <a:rPr lang="en-US" smtClean="0"/>
-              <a:t>5/3/2021</a:t>
+              <a:t>5/4/2021</a:t>
             </a:fld>
             <a:endParaRPr lang="en-US"/>
           </a:p>
@@ -6616,9 +6616,13 @@
             <a:r>
               <a:rPr lang="en-US" sz="3600" b="1" dirty="0">
                 <a:latin typeface="+mn-lt"/>
+                <a:hlinkClick r:id="rId4"/>
               </a:rPr>
               <a:t>Web Application</a:t>
             </a:r>
+            <a:endParaRPr lang="en-US" sz="3600" b="1" dirty="0">
+              <a:latin typeface="+mn-lt"/>
+            </a:endParaRPr>
           </a:p>
         </p:txBody>
       </p:sp>
@@ -6645,7 +6649,7 @@
           </p:nvPr>
         </p:nvPicPr>
         <p:blipFill>
-          <a:blip r:embed="rId4"/>
+          <a:blip r:embed="rId5"/>
           <a:stretch>
             <a:fillRect/>
           </a:stretch>
@@ -6706,15 +6710,33 @@
           <a:lstStyle/>
           <a:p>
             <a:r>
-              <a:rPr lang="en-US" sz="1600" dirty="0"/>
+              <a:rPr lang="en-US" sz="1600" dirty="0">
+                <a:solidFill>
+                  <a:schemeClr val="accent4">
+                    <a:lumMod val="75000"/>
+                  </a:schemeClr>
+                </a:solidFill>
+              </a:rPr>
               <a:t>80% of strokes are preventable </a:t>
             </a:r>
             <a:r>
-              <a:rPr lang="en-US" sz="1600" baseline="30000" dirty="0"/>
+              <a:rPr lang="en-US" sz="1600" baseline="30000" dirty="0">
+                <a:solidFill>
+                  <a:schemeClr val="accent4">
+                    <a:lumMod val="75000"/>
+                  </a:schemeClr>
+                </a:solidFill>
+              </a:rPr>
               <a:t>[5]</a:t>
             </a:r>
             <a:r>
-              <a:rPr lang="en-US" sz="1600" dirty="0"/>
+              <a:rPr lang="en-US" sz="1600" dirty="0">
+                <a:solidFill>
+                  <a:schemeClr val="accent4">
+                    <a:lumMod val="75000"/>
+                  </a:schemeClr>
+                </a:solidFill>
+              </a:rPr>
               <a:t> , American Stroke Association</a:t>
             </a:r>
           </a:p>
@@ -8624,7 +8646,7 @@
         </p:nvSpPr>
         <p:spPr>
           <a:xfrm>
-            <a:off x="404734" y="155265"/>
+            <a:off x="467193" y="2134664"/>
             <a:ext cx="11257614" cy="1325563"/>
           </a:xfrm>
         </p:spPr>
@@ -8634,11 +8656,12 @@
           </a:bodyPr>
           <a:lstStyle/>
           <a:p>
+            <a:pPr algn="ctr"/>
             <a:r>
               <a:rPr lang="en-US" sz="3600" b="1" dirty="0">
                 <a:latin typeface="+mn-lt"/>
               </a:rPr>
-              <a:t>References</a:t>
+              <a:t>Questions?</a:t>
             </a:r>
           </a:p>
         </p:txBody>
@@ -8718,7 +8741,7 @@
         </p:nvSpPr>
         <p:spPr>
           <a:xfrm>
-            <a:off x="3053619" y="6341727"/>
+            <a:off x="3143564" y="6341727"/>
             <a:ext cx="6504482" cy="365125"/>
           </a:xfrm>
         </p:spPr>
@@ -8754,487 +8777,15 @@
                   </a:schemeClr>
                 </a:solidFill>
               </a:rPr>
-              <a:t>  American Stroke Association</a:t>
-            </a:r>
-          </a:p>
-        </p:txBody>
-      </p:sp>
-      <p:sp>
-        <p:nvSpPr>
-          <p:cNvPr id="6" name="Content Placeholder 5">
-            <a:extLst>
-              <a:ext uri="{FF2B5EF4-FFF2-40B4-BE49-F238E27FC236}">
-                <a16:creationId xmlns:a16="http://schemas.microsoft.com/office/drawing/2014/main" id="{2F5942C1-38CA-448B-B8ED-FD2938454822}"/>
-              </a:ext>
-            </a:extLst>
-          </p:cNvPr>
-          <p:cNvSpPr>
-            <a:spLocks noGrp="1"/>
-          </p:cNvSpPr>
-          <p:nvPr>
-            <p:ph sz="half" idx="2"/>
-          </p:nvPr>
-        </p:nvSpPr>
-        <p:spPr>
-          <a:xfrm>
-            <a:off x="1361296" y="1250080"/>
-            <a:ext cx="9375409" cy="4627808"/>
-          </a:xfrm>
-        </p:spPr>
-        <p:txBody>
-          <a:bodyPr>
-            <a:normAutofit/>
-          </a:bodyPr>
-          <a:lstStyle/>
-          <a:p>
-            <a:pPr marL="0" marR="0">
-              <a:lnSpc>
-                <a:spcPct val="107000"/>
-              </a:lnSpc>
-              <a:spcBef>
-                <a:spcPts val="0"/>
-              </a:spcBef>
-              <a:spcAft>
-                <a:spcPts val="800"/>
-              </a:spcAft>
-            </a:pPr>
-            <a:r>
-              <a:rPr lang="en-US" sz="1800" dirty="0">
-                <a:solidFill>
-                  <a:srgbClr val="000000"/>
-                </a:solidFill>
-                <a:effectLst/>
-                <a:latin typeface="Times New Roman" panose="02020603050405020304" pitchFamily="18" charset="0"/>
-                <a:ea typeface="Calibri" panose="020F0502020204030204" pitchFamily="34" charset="0"/>
-                <a:cs typeface="Times New Roman" panose="02020603050405020304" pitchFamily="18" charset="0"/>
-              </a:rPr>
-              <a:t>[1] Ahmad FB, </a:t>
-            </a:r>
-            <a:r>
-              <a:rPr lang="en-US" sz="1800" dirty="0" err="1">
-                <a:solidFill>
-                  <a:srgbClr val="000000"/>
-                </a:solidFill>
-                <a:effectLst/>
-                <a:latin typeface="Times New Roman" panose="02020603050405020304" pitchFamily="18" charset="0"/>
-                <a:ea typeface="Calibri" panose="020F0502020204030204" pitchFamily="34" charset="0"/>
-                <a:cs typeface="Times New Roman" panose="02020603050405020304" pitchFamily="18" charset="0"/>
-              </a:rPr>
-              <a:t>Cisewski</a:t>
-            </a:r>
-            <a:r>
-              <a:rPr lang="en-US" sz="1800" dirty="0">
-                <a:solidFill>
-                  <a:srgbClr val="000000"/>
-                </a:solidFill>
-                <a:effectLst/>
-                <a:latin typeface="Times New Roman" panose="02020603050405020304" pitchFamily="18" charset="0"/>
-                <a:ea typeface="Calibri" panose="020F0502020204030204" pitchFamily="34" charset="0"/>
-                <a:cs typeface="Times New Roman" panose="02020603050405020304" pitchFamily="18" charset="0"/>
-              </a:rPr>
-              <a:t> JA, </a:t>
-            </a:r>
-            <a:r>
-              <a:rPr lang="en-US" sz="1800" dirty="0" err="1">
-                <a:solidFill>
-                  <a:srgbClr val="000000"/>
-                </a:solidFill>
-                <a:effectLst/>
-                <a:latin typeface="Times New Roman" panose="02020603050405020304" pitchFamily="18" charset="0"/>
-                <a:ea typeface="Calibri" panose="020F0502020204030204" pitchFamily="34" charset="0"/>
-                <a:cs typeface="Times New Roman" panose="02020603050405020304" pitchFamily="18" charset="0"/>
-              </a:rPr>
-              <a:t>Miniño</a:t>
-            </a:r>
-            <a:r>
-              <a:rPr lang="en-US" sz="1800" dirty="0">
-                <a:solidFill>
-                  <a:srgbClr val="000000"/>
-                </a:solidFill>
-                <a:effectLst/>
-                <a:latin typeface="Times New Roman" panose="02020603050405020304" pitchFamily="18" charset="0"/>
-                <a:ea typeface="Calibri" panose="020F0502020204030204" pitchFamily="34" charset="0"/>
-                <a:cs typeface="Times New Roman" panose="02020603050405020304" pitchFamily="18" charset="0"/>
-              </a:rPr>
-              <a:t> A, Anderson RN. Provisional Mortality Data — United States, 2020. MMWR </a:t>
-            </a:r>
-            <a:r>
-              <a:rPr lang="en-US" sz="1800" dirty="0" err="1">
-                <a:solidFill>
-                  <a:srgbClr val="000000"/>
-                </a:solidFill>
-                <a:effectLst/>
-                <a:latin typeface="Times New Roman" panose="02020603050405020304" pitchFamily="18" charset="0"/>
-                <a:ea typeface="Calibri" panose="020F0502020204030204" pitchFamily="34" charset="0"/>
-                <a:cs typeface="Times New Roman" panose="02020603050405020304" pitchFamily="18" charset="0"/>
-              </a:rPr>
-              <a:t>Morb</a:t>
-            </a:r>
-            <a:r>
-              <a:rPr lang="en-US" sz="1800" dirty="0">
-                <a:solidFill>
-                  <a:srgbClr val="000000"/>
-                </a:solidFill>
-                <a:effectLst/>
-                <a:latin typeface="Times New Roman" panose="02020603050405020304" pitchFamily="18" charset="0"/>
-                <a:ea typeface="Calibri" panose="020F0502020204030204" pitchFamily="34" charset="0"/>
-                <a:cs typeface="Times New Roman" panose="02020603050405020304" pitchFamily="18" charset="0"/>
-              </a:rPr>
-              <a:t> Mortal </a:t>
-            </a:r>
-            <a:r>
-              <a:rPr lang="en-US" sz="1800" dirty="0" err="1">
-                <a:solidFill>
-                  <a:srgbClr val="000000"/>
-                </a:solidFill>
-                <a:effectLst/>
-                <a:latin typeface="Times New Roman" panose="02020603050405020304" pitchFamily="18" charset="0"/>
-                <a:ea typeface="Calibri" panose="020F0502020204030204" pitchFamily="34" charset="0"/>
-                <a:cs typeface="Times New Roman" panose="02020603050405020304" pitchFamily="18" charset="0"/>
-              </a:rPr>
-              <a:t>Wkly</a:t>
-            </a:r>
-            <a:r>
-              <a:rPr lang="en-US" sz="1800" dirty="0">
-                <a:solidFill>
-                  <a:srgbClr val="000000"/>
-                </a:solidFill>
-                <a:effectLst/>
-                <a:latin typeface="Times New Roman" panose="02020603050405020304" pitchFamily="18" charset="0"/>
-                <a:ea typeface="Calibri" panose="020F0502020204030204" pitchFamily="34" charset="0"/>
-                <a:cs typeface="Times New Roman" panose="02020603050405020304" pitchFamily="18" charset="0"/>
-              </a:rPr>
-              <a:t> Rep 2021;70:519–522. DOI: </a:t>
-            </a:r>
-            <a:r>
-              <a:rPr lang="en-US" sz="1800" u="sng" dirty="0">
-                <a:solidFill>
-                  <a:srgbClr val="000000"/>
-                </a:solidFill>
-                <a:effectLst/>
-                <a:latin typeface="Times New Roman" panose="02020603050405020304" pitchFamily="18" charset="0"/>
-                <a:ea typeface="Calibri" panose="020F0502020204030204" pitchFamily="34" charset="0"/>
-                <a:cs typeface="Times New Roman" panose="02020603050405020304" pitchFamily="18" charset="0"/>
-                <a:hlinkClick r:id="rId5"/>
-              </a:rPr>
-              <a:t>https://www.cdc.gov/mmwr/volumes/70/wr/mm7014e1.htm?s_cid=mm7014e1_w#F1_down</a:t>
-            </a:r>
-            <a:endParaRPr lang="en-US" sz="1800" dirty="0">
-              <a:effectLst/>
-              <a:latin typeface="Calibri" panose="020F0502020204030204" pitchFamily="34" charset="0"/>
-              <a:ea typeface="Calibri" panose="020F0502020204030204" pitchFamily="34" charset="0"/>
-              <a:cs typeface="Times New Roman" panose="02020603050405020304" pitchFamily="18" charset="0"/>
-            </a:endParaRPr>
-          </a:p>
-          <a:p>
-            <a:pPr marL="0" marR="0">
-              <a:lnSpc>
-                <a:spcPct val="107000"/>
-              </a:lnSpc>
-              <a:spcBef>
-                <a:spcPts val="0"/>
-              </a:spcBef>
-              <a:spcAft>
-                <a:spcPts val="800"/>
-              </a:spcAft>
-            </a:pPr>
-            <a:r>
-              <a:rPr lang="en-US" sz="1800" dirty="0">
-                <a:effectLst/>
-                <a:latin typeface="Times New Roman" panose="02020603050405020304" pitchFamily="18" charset="0"/>
-                <a:ea typeface="Calibri" panose="020F0502020204030204" pitchFamily="34" charset="0"/>
-                <a:cs typeface="Times New Roman" panose="02020603050405020304" pitchFamily="18" charset="0"/>
-              </a:rPr>
-              <a:t>[2] American Stroke Association, </a:t>
-            </a:r>
-            <a:r>
-              <a:rPr lang="en-US" sz="1800" u="sng" dirty="0">
-                <a:solidFill>
-                  <a:srgbClr val="000000"/>
-                </a:solidFill>
-                <a:effectLst/>
-                <a:latin typeface="Times New Roman" panose="02020603050405020304" pitchFamily="18" charset="0"/>
-                <a:ea typeface="Calibri" panose="020F0502020204030204" pitchFamily="34" charset="0"/>
-                <a:cs typeface="Times New Roman" panose="02020603050405020304" pitchFamily="18" charset="0"/>
-                <a:hlinkClick r:id="rId6"/>
-              </a:rPr>
-              <a:t>https://www.stroke.org/en/about-stroke/types-of-stroke/ischemic-stroke-clots</a:t>
-            </a:r>
-            <a:endParaRPr lang="en-US" sz="1800" dirty="0">
-              <a:effectLst/>
-              <a:latin typeface="Calibri" panose="020F0502020204030204" pitchFamily="34" charset="0"/>
-              <a:ea typeface="Calibri" panose="020F0502020204030204" pitchFamily="34" charset="0"/>
-              <a:cs typeface="Times New Roman" panose="02020603050405020304" pitchFamily="18" charset="0"/>
-            </a:endParaRPr>
-          </a:p>
-          <a:p>
-            <a:pPr marL="0" marR="0">
-              <a:lnSpc>
-                <a:spcPct val="107000"/>
-              </a:lnSpc>
-              <a:spcBef>
-                <a:spcPts val="0"/>
-              </a:spcBef>
-              <a:spcAft>
-                <a:spcPts val="800"/>
-              </a:spcAft>
-            </a:pPr>
-            <a:r>
-              <a:rPr lang="en-US" sz="1800" dirty="0">
-                <a:effectLst/>
-                <a:latin typeface="Times New Roman" panose="02020603050405020304" pitchFamily="18" charset="0"/>
-                <a:ea typeface="Calibri" panose="020F0502020204030204" pitchFamily="34" charset="0"/>
-                <a:cs typeface="Times New Roman" panose="02020603050405020304" pitchFamily="18" charset="0"/>
-              </a:rPr>
-              <a:t>[3] American Stroke Association, </a:t>
-            </a:r>
-            <a:r>
-              <a:rPr lang="en-US" sz="1800" u="sng" dirty="0">
-                <a:solidFill>
-                  <a:srgbClr val="0563C1"/>
-                </a:solidFill>
-                <a:effectLst/>
-                <a:latin typeface="Times New Roman" panose="02020603050405020304" pitchFamily="18" charset="0"/>
-                <a:ea typeface="Calibri" panose="020F0502020204030204" pitchFamily="34" charset="0"/>
-                <a:cs typeface="Times New Roman" panose="02020603050405020304" pitchFamily="18" charset="0"/>
-                <a:hlinkClick r:id="rId7"/>
-              </a:rPr>
-              <a:t>https://www.stroke.org/en/about-stroke/types-of-stroke/hemorrhagic-strokes-bleeds</a:t>
-            </a:r>
-            <a:endParaRPr lang="en-US" sz="1800" dirty="0">
-              <a:effectLst/>
-              <a:latin typeface="Calibri" panose="020F0502020204030204" pitchFamily="34" charset="0"/>
-              <a:ea typeface="Calibri" panose="020F0502020204030204" pitchFamily="34" charset="0"/>
-              <a:cs typeface="Times New Roman" panose="02020603050405020304" pitchFamily="18" charset="0"/>
-            </a:endParaRPr>
-          </a:p>
-          <a:p>
-            <a:pPr marL="0" marR="0">
-              <a:lnSpc>
-                <a:spcPct val="107000"/>
-              </a:lnSpc>
-              <a:spcBef>
-                <a:spcPts val="0"/>
-              </a:spcBef>
-              <a:spcAft>
-                <a:spcPts val="800"/>
-              </a:spcAft>
-            </a:pPr>
-            <a:r>
-              <a:rPr lang="en-US" sz="1800" dirty="0">
-                <a:effectLst/>
-                <a:latin typeface="Times New Roman" panose="02020603050405020304" pitchFamily="18" charset="0"/>
-                <a:ea typeface="Calibri" panose="020F0502020204030204" pitchFamily="34" charset="0"/>
-                <a:cs typeface="Times New Roman" panose="02020603050405020304" pitchFamily="18" charset="0"/>
-              </a:rPr>
-              <a:t>[4] American Stroke Association, </a:t>
-            </a:r>
-            <a:r>
-              <a:rPr lang="en-US" sz="1800" i="1" dirty="0">
-                <a:effectLst/>
-                <a:latin typeface="Times New Roman" panose="02020603050405020304" pitchFamily="18" charset="0"/>
-                <a:ea typeface="Calibri" panose="020F0502020204030204" pitchFamily="34" charset="0"/>
-                <a:cs typeface="Times New Roman" panose="02020603050405020304" pitchFamily="18" charset="0"/>
-              </a:rPr>
-              <a:t>Explaining Stroke</a:t>
-            </a:r>
-            <a:r>
-              <a:rPr lang="en-US" sz="1800" dirty="0">
-                <a:effectLst/>
-                <a:latin typeface="Times New Roman" panose="02020603050405020304" pitchFamily="18" charset="0"/>
-                <a:ea typeface="Calibri" panose="020F0502020204030204" pitchFamily="34" charset="0"/>
-                <a:cs typeface="Times New Roman" panose="02020603050405020304" pitchFamily="18" charset="0"/>
-              </a:rPr>
-              <a:t>, pages 1-20</a:t>
-            </a:r>
-            <a:r>
-              <a:rPr lang="en-US" sz="1800" dirty="0">
-                <a:solidFill>
-                  <a:srgbClr val="0563C1"/>
-                </a:solidFill>
-                <a:effectLst/>
-                <a:latin typeface="Times New Roman" panose="02020603050405020304" pitchFamily="18" charset="0"/>
-                <a:ea typeface="Calibri" panose="020F0502020204030204" pitchFamily="34" charset="0"/>
-                <a:cs typeface="Times New Roman" panose="02020603050405020304" pitchFamily="18" charset="0"/>
-              </a:rPr>
-              <a:t>, </a:t>
-            </a:r>
-            <a:r>
-              <a:rPr lang="en-US" sz="1800" u="sng" dirty="0">
-                <a:solidFill>
-                  <a:srgbClr val="000000"/>
-                </a:solidFill>
-                <a:effectLst/>
-                <a:latin typeface="Times New Roman" panose="02020603050405020304" pitchFamily="18" charset="0"/>
-                <a:ea typeface="Calibri" panose="020F0502020204030204" pitchFamily="34" charset="0"/>
-                <a:cs typeface="Times New Roman" panose="02020603050405020304" pitchFamily="18" charset="0"/>
-                <a:hlinkClick r:id="rId8"/>
-              </a:rPr>
-              <a:t>https://www.stroke.org/-/media/stroke-files/stroke-resource-center/brochures/explaining_stroke_brochure_6_25_19.pdf?la=en</a:t>
-            </a:r>
-            <a:endParaRPr lang="en-US" sz="1800" dirty="0">
-              <a:effectLst/>
-              <a:latin typeface="Calibri" panose="020F0502020204030204" pitchFamily="34" charset="0"/>
-              <a:ea typeface="Calibri" panose="020F0502020204030204" pitchFamily="34" charset="0"/>
-              <a:cs typeface="Times New Roman" panose="02020603050405020304" pitchFamily="18" charset="0"/>
-            </a:endParaRPr>
-          </a:p>
-          <a:p>
-            <a:pPr marL="0" marR="0">
-              <a:lnSpc>
-                <a:spcPct val="107000"/>
-              </a:lnSpc>
-              <a:spcBef>
-                <a:spcPts val="0"/>
-              </a:spcBef>
-              <a:spcAft>
-                <a:spcPts val="800"/>
-              </a:spcAft>
-            </a:pPr>
-            <a:r>
-              <a:rPr lang="en-US" sz="1800" dirty="0">
-                <a:effectLst/>
-                <a:latin typeface="Times New Roman" panose="02020603050405020304" pitchFamily="18" charset="0"/>
-                <a:ea typeface="Calibri" panose="020F0502020204030204" pitchFamily="34" charset="0"/>
-                <a:cs typeface="Times New Roman" panose="02020603050405020304" pitchFamily="18" charset="0"/>
-              </a:rPr>
-              <a:t>[5] American Stroke Association, </a:t>
-            </a:r>
-            <a:r>
-              <a:rPr lang="en-US" sz="1800" u="sng" dirty="0">
-                <a:solidFill>
-                  <a:srgbClr val="000000"/>
-                </a:solidFill>
-                <a:effectLst/>
-                <a:latin typeface="Times New Roman" panose="02020603050405020304" pitchFamily="18" charset="0"/>
-                <a:ea typeface="Calibri" panose="020F0502020204030204" pitchFamily="34" charset="0"/>
-                <a:cs typeface="Times New Roman" panose="02020603050405020304" pitchFamily="18" charset="0"/>
-                <a:hlinkClick r:id="rId9"/>
-              </a:rPr>
-              <a:t>https://www.stroke.org/en/about-stroke</a:t>
-            </a:r>
-            <a:endParaRPr lang="en-US" sz="1800" u="sng" dirty="0">
-              <a:solidFill>
-                <a:srgbClr val="000000"/>
-              </a:solidFill>
-              <a:effectLst/>
-              <a:latin typeface="Times New Roman" panose="02020603050405020304" pitchFamily="18" charset="0"/>
-              <a:ea typeface="Calibri" panose="020F0502020204030204" pitchFamily="34" charset="0"/>
-              <a:cs typeface="Times New Roman" panose="02020603050405020304" pitchFamily="18" charset="0"/>
-            </a:endParaRPr>
-          </a:p>
-          <a:p>
-            <a:pPr marL="0">
-              <a:lnSpc>
-                <a:spcPct val="107000"/>
-              </a:lnSpc>
-              <a:spcBef>
-                <a:spcPts val="0"/>
-              </a:spcBef>
-              <a:spcAft>
-                <a:spcPts val="800"/>
-              </a:spcAft>
-            </a:pPr>
-            <a:r>
-              <a:rPr lang="en-US" sz="1800" dirty="0">
-                <a:solidFill>
-                  <a:srgbClr val="000000"/>
-                </a:solidFill>
-                <a:effectLst/>
-                <a:latin typeface="Times New Roman" panose="02020603050405020304" pitchFamily="18" charset="0"/>
-                <a:ea typeface="Calibri" panose="020F0502020204030204" pitchFamily="34" charset="0"/>
-                <a:cs typeface="Times New Roman" panose="02020603050405020304" pitchFamily="18" charset="0"/>
-              </a:rPr>
-              <a:t>[6] Stroke Prediction Dataset, </a:t>
-            </a:r>
-            <a:r>
-              <a:rPr lang="en-US" sz="1800" i="1" dirty="0">
-                <a:solidFill>
-                  <a:srgbClr val="000000"/>
-                </a:solidFill>
-                <a:effectLst/>
-                <a:latin typeface="Times New Roman" panose="02020603050405020304" pitchFamily="18" charset="0"/>
-                <a:ea typeface="Calibri" panose="020F0502020204030204" pitchFamily="34" charset="0"/>
-                <a:cs typeface="Times New Roman" panose="02020603050405020304" pitchFamily="18" charset="0"/>
-              </a:rPr>
-              <a:t>11 clinical features por predicting stroke events</a:t>
-            </a:r>
-            <a:r>
-              <a:rPr lang="en-US" sz="1800" dirty="0">
-                <a:solidFill>
-                  <a:srgbClr val="000000"/>
-                </a:solidFill>
-                <a:effectLst/>
-                <a:latin typeface="Times New Roman" panose="02020603050405020304" pitchFamily="18" charset="0"/>
-                <a:ea typeface="Calibri" panose="020F0502020204030204" pitchFamily="34" charset="0"/>
-                <a:cs typeface="Times New Roman" panose="02020603050405020304" pitchFamily="18" charset="0"/>
-              </a:rPr>
-              <a:t>, </a:t>
-            </a:r>
-            <a:r>
-              <a:rPr lang="en-US" sz="1800" u="sng" dirty="0">
-                <a:solidFill>
-                  <a:srgbClr val="0563C1"/>
-                </a:solidFill>
-                <a:effectLst/>
-                <a:latin typeface="Times New Roman" panose="02020603050405020304" pitchFamily="18" charset="0"/>
-                <a:ea typeface="Calibri" panose="020F0502020204030204" pitchFamily="34" charset="0"/>
-                <a:cs typeface="Times New Roman" panose="02020603050405020304" pitchFamily="18" charset="0"/>
-                <a:hlinkClick r:id="rId10"/>
-              </a:rPr>
-              <a:t>https://www.kaggle.com/fedesoriano/stroke-prediction-dataset</a:t>
-            </a:r>
-            <a:endParaRPr lang="en-US" sz="1800" dirty="0">
-              <a:effectLst/>
-              <a:latin typeface="Calibri" panose="020F0502020204030204" pitchFamily="34" charset="0"/>
-              <a:ea typeface="Calibri" panose="020F0502020204030204" pitchFamily="34" charset="0"/>
-              <a:cs typeface="Times New Roman" panose="02020603050405020304" pitchFamily="18" charset="0"/>
-            </a:endParaRPr>
-          </a:p>
-          <a:p>
-            <a:pPr marL="0" marR="0">
-              <a:lnSpc>
-                <a:spcPct val="107000"/>
-              </a:lnSpc>
-              <a:spcBef>
-                <a:spcPts val="0"/>
-              </a:spcBef>
-              <a:spcAft>
-                <a:spcPts val="800"/>
-              </a:spcAft>
-            </a:pPr>
-            <a:endParaRPr lang="en-US" sz="1800" dirty="0">
-              <a:effectLst/>
-              <a:latin typeface="Calibri" panose="020F0502020204030204" pitchFamily="34" charset="0"/>
-              <a:ea typeface="Calibri" panose="020F0502020204030204" pitchFamily="34" charset="0"/>
-              <a:cs typeface="Times New Roman" panose="02020603050405020304" pitchFamily="18" charset="0"/>
-            </a:endParaRPr>
-          </a:p>
-          <a:p>
-            <a:pPr marL="0" marR="0" indent="0">
-              <a:lnSpc>
-                <a:spcPct val="107000"/>
-              </a:lnSpc>
-              <a:spcBef>
-                <a:spcPts val="0"/>
-              </a:spcBef>
-              <a:spcAft>
-                <a:spcPts val="800"/>
-              </a:spcAft>
-              <a:buNone/>
-            </a:pPr>
-            <a:endParaRPr lang="en-US" sz="1800" dirty="0">
-              <a:effectLst/>
-              <a:ea typeface="Calibri" panose="020F0502020204030204" pitchFamily="34" charset="0"/>
-              <a:cs typeface="Times New Roman" panose="02020603050405020304" pitchFamily="18" charset="0"/>
-            </a:endParaRPr>
+              <a:t> , American Stroke Association</a:t>
+            </a:r>
           </a:p>
         </p:txBody>
       </p:sp>
     </p:spTree>
     <p:extLst>
       <p:ext uri="{BB962C8B-B14F-4D97-AF65-F5344CB8AC3E}">
-        <p14:creationId xmlns:p14="http://schemas.microsoft.com/office/powerpoint/2010/main" val="1344548007"/>
+        <p14:creationId xmlns:p14="http://schemas.microsoft.com/office/powerpoint/2010/main" val="1762654475"/>
       </p:ext>
     </p:extLst>
   </p:cSld>
@@ -9417,7 +8968,7 @@
         </p:nvSpPr>
         <p:spPr>
           <a:xfrm>
-            <a:off x="467193" y="2134664"/>
+            <a:off x="404734" y="155265"/>
             <a:ext cx="11257614" cy="1325563"/>
           </a:xfrm>
         </p:spPr>
@@ -9427,12 +8978,11 @@
           </a:bodyPr>
           <a:lstStyle/>
           <a:p>
-            <a:pPr algn="ctr"/>
             <a:r>
               <a:rPr lang="en-US" sz="3600" b="1" dirty="0">
                 <a:latin typeface="+mn-lt"/>
               </a:rPr>
-              <a:t>Questions?</a:t>
+              <a:t>References</a:t>
             </a:r>
           </a:p>
         </p:txBody>
@@ -9512,7 +9062,7 @@
         </p:nvSpPr>
         <p:spPr>
           <a:xfrm>
-            <a:off x="3143564" y="6341727"/>
+            <a:off x="3053619" y="6341727"/>
             <a:ext cx="6504482" cy="365125"/>
           </a:xfrm>
         </p:spPr>
@@ -9521,24 +9071,514 @@
           <a:lstStyle/>
           <a:p>
             <a:r>
-              <a:rPr lang="en-US" sz="1600" dirty="0"/>
+              <a:rPr lang="en-US" sz="1600" dirty="0">
+                <a:solidFill>
+                  <a:schemeClr val="accent4">
+                    <a:lumMod val="75000"/>
+                  </a:schemeClr>
+                </a:solidFill>
+              </a:rPr>
               <a:t>80% of strokes are preventable </a:t>
             </a:r>
             <a:r>
-              <a:rPr lang="en-US" sz="1600" baseline="30000" dirty="0"/>
+              <a:rPr lang="en-US" sz="1600" baseline="30000" dirty="0">
+                <a:solidFill>
+                  <a:schemeClr val="accent4">
+                    <a:lumMod val="75000"/>
+                  </a:schemeClr>
+                </a:solidFill>
+              </a:rPr>
               <a:t>[5]</a:t>
             </a:r>
             <a:r>
-              <a:rPr lang="en-US" sz="1600" dirty="0"/>
-              <a:t> , American Stroke Association</a:t>
-            </a:r>
+              <a:rPr lang="en-US" sz="1600" dirty="0">
+                <a:solidFill>
+                  <a:schemeClr val="accent4">
+                    <a:lumMod val="75000"/>
+                  </a:schemeClr>
+                </a:solidFill>
+              </a:rPr>
+              <a:t>  American Stroke Association</a:t>
+            </a:r>
+          </a:p>
+        </p:txBody>
+      </p:sp>
+      <p:sp>
+        <p:nvSpPr>
+          <p:cNvPr id="6" name="Content Placeholder 5">
+            <a:extLst>
+              <a:ext uri="{FF2B5EF4-FFF2-40B4-BE49-F238E27FC236}">
+                <a16:creationId xmlns:a16="http://schemas.microsoft.com/office/drawing/2014/main" id="{2F5942C1-38CA-448B-B8ED-FD2938454822}"/>
+              </a:ext>
+            </a:extLst>
+          </p:cNvPr>
+          <p:cNvSpPr>
+            <a:spLocks noGrp="1"/>
+          </p:cNvSpPr>
+          <p:nvPr>
+            <p:ph sz="half" idx="2"/>
+          </p:nvPr>
+        </p:nvSpPr>
+        <p:spPr>
+          <a:xfrm>
+            <a:off x="1361296" y="1250080"/>
+            <a:ext cx="9375409" cy="4627808"/>
+          </a:xfrm>
+        </p:spPr>
+        <p:txBody>
+          <a:bodyPr>
+            <a:normAutofit/>
+          </a:bodyPr>
+          <a:lstStyle/>
+          <a:p>
+            <a:pPr marL="0" marR="0">
+              <a:lnSpc>
+                <a:spcPct val="107000"/>
+              </a:lnSpc>
+              <a:spcBef>
+                <a:spcPts val="0"/>
+              </a:spcBef>
+              <a:spcAft>
+                <a:spcPts val="800"/>
+              </a:spcAft>
+            </a:pPr>
+            <a:r>
+              <a:rPr lang="en-US" sz="1800" dirty="0">
+                <a:solidFill>
+                  <a:srgbClr val="000000"/>
+                </a:solidFill>
+                <a:effectLst/>
+                <a:latin typeface="Times New Roman" panose="02020603050405020304" pitchFamily="18" charset="0"/>
+                <a:ea typeface="Calibri" panose="020F0502020204030204" pitchFamily="34" charset="0"/>
+                <a:cs typeface="Times New Roman" panose="02020603050405020304" pitchFamily="18" charset="0"/>
+              </a:rPr>
+              <a:t>[1] Ahmad FB, </a:t>
+            </a:r>
+            <a:r>
+              <a:rPr lang="en-US" sz="1800" dirty="0" err="1">
+                <a:solidFill>
+                  <a:srgbClr val="000000"/>
+                </a:solidFill>
+                <a:effectLst/>
+                <a:latin typeface="Times New Roman" panose="02020603050405020304" pitchFamily="18" charset="0"/>
+                <a:ea typeface="Calibri" panose="020F0502020204030204" pitchFamily="34" charset="0"/>
+                <a:cs typeface="Times New Roman" panose="02020603050405020304" pitchFamily="18" charset="0"/>
+              </a:rPr>
+              <a:t>Cisewski</a:t>
+            </a:r>
+            <a:r>
+              <a:rPr lang="en-US" sz="1800" dirty="0">
+                <a:solidFill>
+                  <a:srgbClr val="000000"/>
+                </a:solidFill>
+                <a:effectLst/>
+                <a:latin typeface="Times New Roman" panose="02020603050405020304" pitchFamily="18" charset="0"/>
+                <a:ea typeface="Calibri" panose="020F0502020204030204" pitchFamily="34" charset="0"/>
+                <a:cs typeface="Times New Roman" panose="02020603050405020304" pitchFamily="18" charset="0"/>
+              </a:rPr>
+              <a:t> JA, </a:t>
+            </a:r>
+            <a:r>
+              <a:rPr lang="en-US" sz="1800" dirty="0" err="1">
+                <a:solidFill>
+                  <a:srgbClr val="000000"/>
+                </a:solidFill>
+                <a:effectLst/>
+                <a:latin typeface="Times New Roman" panose="02020603050405020304" pitchFamily="18" charset="0"/>
+                <a:ea typeface="Calibri" panose="020F0502020204030204" pitchFamily="34" charset="0"/>
+                <a:cs typeface="Times New Roman" panose="02020603050405020304" pitchFamily="18" charset="0"/>
+              </a:rPr>
+              <a:t>Miniño</a:t>
+            </a:r>
+            <a:r>
+              <a:rPr lang="en-US" sz="1800" dirty="0">
+                <a:solidFill>
+                  <a:srgbClr val="000000"/>
+                </a:solidFill>
+                <a:effectLst/>
+                <a:latin typeface="Times New Roman" panose="02020603050405020304" pitchFamily="18" charset="0"/>
+                <a:ea typeface="Calibri" panose="020F0502020204030204" pitchFamily="34" charset="0"/>
+                <a:cs typeface="Times New Roman" panose="02020603050405020304" pitchFamily="18" charset="0"/>
+              </a:rPr>
+              <a:t> A, Anderson RN. Provisional Mortality Data — United States, 2020. MMWR </a:t>
+            </a:r>
+            <a:r>
+              <a:rPr lang="en-US" sz="1800" dirty="0" err="1">
+                <a:solidFill>
+                  <a:srgbClr val="000000"/>
+                </a:solidFill>
+                <a:effectLst/>
+                <a:latin typeface="Times New Roman" panose="02020603050405020304" pitchFamily="18" charset="0"/>
+                <a:ea typeface="Calibri" panose="020F0502020204030204" pitchFamily="34" charset="0"/>
+                <a:cs typeface="Times New Roman" panose="02020603050405020304" pitchFamily="18" charset="0"/>
+              </a:rPr>
+              <a:t>Morb</a:t>
+            </a:r>
+            <a:r>
+              <a:rPr lang="en-US" sz="1800" dirty="0">
+                <a:solidFill>
+                  <a:srgbClr val="000000"/>
+                </a:solidFill>
+                <a:effectLst/>
+                <a:latin typeface="Times New Roman" panose="02020603050405020304" pitchFamily="18" charset="0"/>
+                <a:ea typeface="Calibri" panose="020F0502020204030204" pitchFamily="34" charset="0"/>
+                <a:cs typeface="Times New Roman" panose="02020603050405020304" pitchFamily="18" charset="0"/>
+              </a:rPr>
+              <a:t> Mortal </a:t>
+            </a:r>
+            <a:r>
+              <a:rPr lang="en-US" sz="1800" dirty="0" err="1">
+                <a:solidFill>
+                  <a:srgbClr val="000000"/>
+                </a:solidFill>
+                <a:effectLst/>
+                <a:latin typeface="Times New Roman" panose="02020603050405020304" pitchFamily="18" charset="0"/>
+                <a:ea typeface="Calibri" panose="020F0502020204030204" pitchFamily="34" charset="0"/>
+                <a:cs typeface="Times New Roman" panose="02020603050405020304" pitchFamily="18" charset="0"/>
+              </a:rPr>
+              <a:t>Wkly</a:t>
+            </a:r>
+            <a:r>
+              <a:rPr lang="en-US" sz="1800" dirty="0">
+                <a:solidFill>
+                  <a:srgbClr val="000000"/>
+                </a:solidFill>
+                <a:effectLst/>
+                <a:latin typeface="Times New Roman" panose="02020603050405020304" pitchFamily="18" charset="0"/>
+                <a:ea typeface="Calibri" panose="020F0502020204030204" pitchFamily="34" charset="0"/>
+                <a:cs typeface="Times New Roman" panose="02020603050405020304" pitchFamily="18" charset="0"/>
+              </a:rPr>
+              <a:t> Rep 2021;70:519–522. DOI: </a:t>
+            </a:r>
+            <a:r>
+              <a:rPr lang="en-US" sz="1800" u="sng" dirty="0">
+                <a:solidFill>
+                  <a:srgbClr val="000000"/>
+                </a:solidFill>
+                <a:effectLst/>
+                <a:latin typeface="Times New Roman" panose="02020603050405020304" pitchFamily="18" charset="0"/>
+                <a:ea typeface="Calibri" panose="020F0502020204030204" pitchFamily="34" charset="0"/>
+                <a:cs typeface="Times New Roman" panose="02020603050405020304" pitchFamily="18" charset="0"/>
+                <a:hlinkClick r:id="rId5"/>
+              </a:rPr>
+              <a:t>https://www.cdc.gov/mmwr/volumes/70/wr/mm7014e1.htm?s_cid=mm7014e1_w#F1_down</a:t>
+            </a:r>
+            <a:endParaRPr lang="en-US" sz="1800" dirty="0">
+              <a:effectLst/>
+              <a:latin typeface="Calibri" panose="020F0502020204030204" pitchFamily="34" charset="0"/>
+              <a:ea typeface="Calibri" panose="020F0502020204030204" pitchFamily="34" charset="0"/>
+              <a:cs typeface="Times New Roman" panose="02020603050405020304" pitchFamily="18" charset="0"/>
+            </a:endParaRPr>
+          </a:p>
+          <a:p>
+            <a:pPr marL="0" marR="0">
+              <a:lnSpc>
+                <a:spcPct val="107000"/>
+              </a:lnSpc>
+              <a:spcBef>
+                <a:spcPts val="0"/>
+              </a:spcBef>
+              <a:spcAft>
+                <a:spcPts val="800"/>
+              </a:spcAft>
+            </a:pPr>
+            <a:r>
+              <a:rPr lang="en-US" sz="1800" dirty="0">
+                <a:effectLst/>
+                <a:latin typeface="Times New Roman" panose="02020603050405020304" pitchFamily="18" charset="0"/>
+                <a:ea typeface="Calibri" panose="020F0502020204030204" pitchFamily="34" charset="0"/>
+                <a:cs typeface="Times New Roman" panose="02020603050405020304" pitchFamily="18" charset="0"/>
+              </a:rPr>
+              <a:t>[2] American Stroke Association, </a:t>
+            </a:r>
+            <a:r>
+              <a:rPr lang="en-US" sz="1800" u="sng" dirty="0">
+                <a:solidFill>
+                  <a:srgbClr val="000000"/>
+                </a:solidFill>
+                <a:effectLst/>
+                <a:latin typeface="Times New Roman" panose="02020603050405020304" pitchFamily="18" charset="0"/>
+                <a:ea typeface="Calibri" panose="020F0502020204030204" pitchFamily="34" charset="0"/>
+                <a:cs typeface="Times New Roman" panose="02020603050405020304" pitchFamily="18" charset="0"/>
+                <a:hlinkClick r:id="rId6"/>
+              </a:rPr>
+              <a:t>https://www.stroke.org/en/about-stroke/types-of-stroke/ischemic-stroke-clots</a:t>
+            </a:r>
+            <a:endParaRPr lang="en-US" sz="1800" dirty="0">
+              <a:effectLst/>
+              <a:latin typeface="Calibri" panose="020F0502020204030204" pitchFamily="34" charset="0"/>
+              <a:ea typeface="Calibri" panose="020F0502020204030204" pitchFamily="34" charset="0"/>
+              <a:cs typeface="Times New Roman" panose="02020603050405020304" pitchFamily="18" charset="0"/>
+            </a:endParaRPr>
+          </a:p>
+          <a:p>
+            <a:pPr marL="0" marR="0">
+              <a:lnSpc>
+                <a:spcPct val="107000"/>
+              </a:lnSpc>
+              <a:spcBef>
+                <a:spcPts val="0"/>
+              </a:spcBef>
+              <a:spcAft>
+                <a:spcPts val="800"/>
+              </a:spcAft>
+            </a:pPr>
+            <a:r>
+              <a:rPr lang="en-US" sz="1800" dirty="0">
+                <a:effectLst/>
+                <a:latin typeface="Times New Roman" panose="02020603050405020304" pitchFamily="18" charset="0"/>
+                <a:ea typeface="Calibri" panose="020F0502020204030204" pitchFamily="34" charset="0"/>
+                <a:cs typeface="Times New Roman" panose="02020603050405020304" pitchFamily="18" charset="0"/>
+              </a:rPr>
+              <a:t>[3] American Stroke Association, </a:t>
+            </a:r>
+            <a:r>
+              <a:rPr lang="en-US" sz="1800" u="sng" dirty="0">
+                <a:solidFill>
+                  <a:srgbClr val="0563C1"/>
+                </a:solidFill>
+                <a:effectLst/>
+                <a:latin typeface="Times New Roman" panose="02020603050405020304" pitchFamily="18" charset="0"/>
+                <a:ea typeface="Calibri" panose="020F0502020204030204" pitchFamily="34" charset="0"/>
+                <a:cs typeface="Times New Roman" panose="02020603050405020304" pitchFamily="18" charset="0"/>
+                <a:hlinkClick r:id="rId7"/>
+              </a:rPr>
+              <a:t>https://www.stroke.org/en/about-stroke/types-of-stroke/hemorrhagic-strokes-bleeds</a:t>
+            </a:r>
+            <a:endParaRPr lang="en-US" sz="1800" dirty="0">
+              <a:effectLst/>
+              <a:latin typeface="Calibri" panose="020F0502020204030204" pitchFamily="34" charset="0"/>
+              <a:ea typeface="Calibri" panose="020F0502020204030204" pitchFamily="34" charset="0"/>
+              <a:cs typeface="Times New Roman" panose="02020603050405020304" pitchFamily="18" charset="0"/>
+            </a:endParaRPr>
+          </a:p>
+          <a:p>
+            <a:pPr marL="0" marR="0">
+              <a:lnSpc>
+                <a:spcPct val="107000"/>
+              </a:lnSpc>
+              <a:spcBef>
+                <a:spcPts val="0"/>
+              </a:spcBef>
+              <a:spcAft>
+                <a:spcPts val="800"/>
+              </a:spcAft>
+            </a:pPr>
+            <a:r>
+              <a:rPr lang="en-US" sz="1800" dirty="0">
+                <a:effectLst/>
+                <a:latin typeface="Times New Roman" panose="02020603050405020304" pitchFamily="18" charset="0"/>
+                <a:ea typeface="Calibri" panose="020F0502020204030204" pitchFamily="34" charset="0"/>
+                <a:cs typeface="Times New Roman" panose="02020603050405020304" pitchFamily="18" charset="0"/>
+              </a:rPr>
+              <a:t>[4] American Stroke Association, </a:t>
+            </a:r>
+            <a:r>
+              <a:rPr lang="en-US" sz="1800" i="1" dirty="0">
+                <a:effectLst/>
+                <a:latin typeface="Times New Roman" panose="02020603050405020304" pitchFamily="18" charset="0"/>
+                <a:ea typeface="Calibri" panose="020F0502020204030204" pitchFamily="34" charset="0"/>
+                <a:cs typeface="Times New Roman" panose="02020603050405020304" pitchFamily="18" charset="0"/>
+              </a:rPr>
+              <a:t>Explaining Stroke</a:t>
+            </a:r>
+            <a:r>
+              <a:rPr lang="en-US" sz="1800" dirty="0">
+                <a:effectLst/>
+                <a:latin typeface="Times New Roman" panose="02020603050405020304" pitchFamily="18" charset="0"/>
+                <a:ea typeface="Calibri" panose="020F0502020204030204" pitchFamily="34" charset="0"/>
+                <a:cs typeface="Times New Roman" panose="02020603050405020304" pitchFamily="18" charset="0"/>
+              </a:rPr>
+              <a:t>, pages 1-20</a:t>
+            </a:r>
+            <a:r>
+              <a:rPr lang="en-US" sz="1800" dirty="0">
+                <a:solidFill>
+                  <a:srgbClr val="0563C1"/>
+                </a:solidFill>
+                <a:effectLst/>
+                <a:latin typeface="Times New Roman" panose="02020603050405020304" pitchFamily="18" charset="0"/>
+                <a:ea typeface="Calibri" panose="020F0502020204030204" pitchFamily="34" charset="0"/>
+                <a:cs typeface="Times New Roman" panose="02020603050405020304" pitchFamily="18" charset="0"/>
+              </a:rPr>
+              <a:t>, </a:t>
+            </a:r>
+            <a:r>
+              <a:rPr lang="en-US" sz="1800" u="sng" dirty="0">
+                <a:solidFill>
+                  <a:srgbClr val="000000"/>
+                </a:solidFill>
+                <a:effectLst/>
+                <a:latin typeface="Times New Roman" panose="02020603050405020304" pitchFamily="18" charset="0"/>
+                <a:ea typeface="Calibri" panose="020F0502020204030204" pitchFamily="34" charset="0"/>
+                <a:cs typeface="Times New Roman" panose="02020603050405020304" pitchFamily="18" charset="0"/>
+                <a:hlinkClick r:id="rId8"/>
+              </a:rPr>
+              <a:t>https://www.stroke.org/-/media/stroke-files/stroke-resource-center/brochures/explaining_stroke_brochure_6_25_19.pdf?la=en</a:t>
+            </a:r>
+            <a:endParaRPr lang="en-US" sz="1800" dirty="0">
+              <a:effectLst/>
+              <a:latin typeface="Calibri" panose="020F0502020204030204" pitchFamily="34" charset="0"/>
+              <a:ea typeface="Calibri" panose="020F0502020204030204" pitchFamily="34" charset="0"/>
+              <a:cs typeface="Times New Roman" panose="02020603050405020304" pitchFamily="18" charset="0"/>
+            </a:endParaRPr>
+          </a:p>
+          <a:p>
+            <a:pPr marL="0" marR="0">
+              <a:lnSpc>
+                <a:spcPct val="107000"/>
+              </a:lnSpc>
+              <a:spcBef>
+                <a:spcPts val="0"/>
+              </a:spcBef>
+              <a:spcAft>
+                <a:spcPts val="800"/>
+              </a:spcAft>
+            </a:pPr>
+            <a:r>
+              <a:rPr lang="en-US" sz="1800" dirty="0">
+                <a:effectLst/>
+                <a:latin typeface="Times New Roman" panose="02020603050405020304" pitchFamily="18" charset="0"/>
+                <a:ea typeface="Calibri" panose="020F0502020204030204" pitchFamily="34" charset="0"/>
+                <a:cs typeface="Times New Roman" panose="02020603050405020304" pitchFamily="18" charset="0"/>
+              </a:rPr>
+              <a:t>[5] American Stroke Association, </a:t>
+            </a:r>
+            <a:r>
+              <a:rPr lang="en-US" sz="1800" u="sng" dirty="0">
+                <a:solidFill>
+                  <a:srgbClr val="000000"/>
+                </a:solidFill>
+                <a:effectLst/>
+                <a:latin typeface="Times New Roman" panose="02020603050405020304" pitchFamily="18" charset="0"/>
+                <a:ea typeface="Calibri" panose="020F0502020204030204" pitchFamily="34" charset="0"/>
+                <a:cs typeface="Times New Roman" panose="02020603050405020304" pitchFamily="18" charset="0"/>
+                <a:hlinkClick r:id="rId9"/>
+              </a:rPr>
+              <a:t>https://www.stroke.org/en/about-stroke</a:t>
+            </a:r>
+            <a:endParaRPr lang="en-US" sz="1800" u="sng" dirty="0">
+              <a:solidFill>
+                <a:srgbClr val="000000"/>
+              </a:solidFill>
+              <a:effectLst/>
+              <a:latin typeface="Times New Roman" panose="02020603050405020304" pitchFamily="18" charset="0"/>
+              <a:ea typeface="Calibri" panose="020F0502020204030204" pitchFamily="34" charset="0"/>
+              <a:cs typeface="Times New Roman" panose="02020603050405020304" pitchFamily="18" charset="0"/>
+            </a:endParaRPr>
+          </a:p>
+          <a:p>
+            <a:pPr marL="0">
+              <a:lnSpc>
+                <a:spcPct val="107000"/>
+              </a:lnSpc>
+              <a:spcBef>
+                <a:spcPts val="0"/>
+              </a:spcBef>
+              <a:spcAft>
+                <a:spcPts val="800"/>
+              </a:spcAft>
+            </a:pPr>
+            <a:r>
+              <a:rPr lang="en-US" sz="1800" dirty="0">
+                <a:solidFill>
+                  <a:srgbClr val="000000"/>
+                </a:solidFill>
+                <a:effectLst/>
+                <a:latin typeface="Times New Roman" panose="02020603050405020304" pitchFamily="18" charset="0"/>
+                <a:ea typeface="Calibri" panose="020F0502020204030204" pitchFamily="34" charset="0"/>
+                <a:cs typeface="Times New Roman" panose="02020603050405020304" pitchFamily="18" charset="0"/>
+              </a:rPr>
+              <a:t>[6] Stroke Prediction Dataset, </a:t>
+            </a:r>
+            <a:r>
+              <a:rPr lang="en-US" sz="1800" i="1" dirty="0">
+                <a:solidFill>
+                  <a:srgbClr val="000000"/>
+                </a:solidFill>
+                <a:effectLst/>
+                <a:latin typeface="Times New Roman" panose="02020603050405020304" pitchFamily="18" charset="0"/>
+                <a:ea typeface="Calibri" panose="020F0502020204030204" pitchFamily="34" charset="0"/>
+                <a:cs typeface="Times New Roman" panose="02020603050405020304" pitchFamily="18" charset="0"/>
+              </a:rPr>
+              <a:t>11 clinical features por predicting stroke events</a:t>
+            </a:r>
+            <a:r>
+              <a:rPr lang="en-US" sz="1800" dirty="0">
+                <a:solidFill>
+                  <a:srgbClr val="000000"/>
+                </a:solidFill>
+                <a:effectLst/>
+                <a:latin typeface="Times New Roman" panose="02020603050405020304" pitchFamily="18" charset="0"/>
+                <a:ea typeface="Calibri" panose="020F0502020204030204" pitchFamily="34" charset="0"/>
+                <a:cs typeface="Times New Roman" panose="02020603050405020304" pitchFamily="18" charset="0"/>
+              </a:rPr>
+              <a:t>, </a:t>
+            </a:r>
+            <a:r>
+              <a:rPr lang="en-US" sz="1800" u="sng" dirty="0">
+                <a:solidFill>
+                  <a:srgbClr val="0563C1"/>
+                </a:solidFill>
+                <a:effectLst/>
+                <a:latin typeface="Times New Roman" panose="02020603050405020304" pitchFamily="18" charset="0"/>
+                <a:ea typeface="Calibri" panose="020F0502020204030204" pitchFamily="34" charset="0"/>
+                <a:cs typeface="Times New Roman" panose="02020603050405020304" pitchFamily="18" charset="0"/>
+                <a:hlinkClick r:id="rId10"/>
+              </a:rPr>
+              <a:t>https://www.kaggle.com/fedesoriano/stroke-prediction-dataset</a:t>
+            </a:r>
+            <a:endParaRPr lang="en-US" sz="1800" dirty="0">
+              <a:effectLst/>
+              <a:latin typeface="Calibri" panose="020F0502020204030204" pitchFamily="34" charset="0"/>
+              <a:ea typeface="Calibri" panose="020F0502020204030204" pitchFamily="34" charset="0"/>
+              <a:cs typeface="Times New Roman" panose="02020603050405020304" pitchFamily="18" charset="0"/>
+            </a:endParaRPr>
+          </a:p>
+          <a:p>
+            <a:pPr marL="0" marR="0">
+              <a:lnSpc>
+                <a:spcPct val="107000"/>
+              </a:lnSpc>
+              <a:spcBef>
+                <a:spcPts val="0"/>
+              </a:spcBef>
+              <a:spcAft>
+                <a:spcPts val="800"/>
+              </a:spcAft>
+            </a:pPr>
+            <a:endParaRPr lang="en-US" sz="1800" dirty="0">
+              <a:effectLst/>
+              <a:latin typeface="Calibri" panose="020F0502020204030204" pitchFamily="34" charset="0"/>
+              <a:ea typeface="Calibri" panose="020F0502020204030204" pitchFamily="34" charset="0"/>
+              <a:cs typeface="Times New Roman" panose="02020603050405020304" pitchFamily="18" charset="0"/>
+            </a:endParaRPr>
+          </a:p>
+          <a:p>
+            <a:pPr marL="0" marR="0" indent="0">
+              <a:lnSpc>
+                <a:spcPct val="107000"/>
+              </a:lnSpc>
+              <a:spcBef>
+                <a:spcPts val="0"/>
+              </a:spcBef>
+              <a:spcAft>
+                <a:spcPts val="800"/>
+              </a:spcAft>
+              <a:buNone/>
+            </a:pPr>
+            <a:endParaRPr lang="en-US" sz="1800" dirty="0">
+              <a:effectLst/>
+              <a:ea typeface="Calibri" panose="020F0502020204030204" pitchFamily="34" charset="0"/>
+              <a:cs typeface="Times New Roman" panose="02020603050405020304" pitchFamily="18" charset="0"/>
+            </a:endParaRPr>
           </a:p>
         </p:txBody>
       </p:sp>
     </p:spTree>
     <p:extLst>
       <p:ext uri="{BB962C8B-B14F-4D97-AF65-F5344CB8AC3E}">
-        <p14:creationId xmlns:p14="http://schemas.microsoft.com/office/powerpoint/2010/main" val="1762654475"/>
+        <p14:creationId xmlns:p14="http://schemas.microsoft.com/office/powerpoint/2010/main" val="1344548007"/>
       </p:ext>
     </p:extLst>
   </p:cSld>

</xml_diff>